<commit_message>
Write Abstract and Conclusion
</commit_message>
<xml_diff>
--- a/runtime-system.pptx
+++ b/runtime-system.pptx
@@ -243,7 +243,7 @@
           <a:p>
             <a:fld id="{A2505382-DCEE-8E4A-85B6-A05CFA2DF929}" type="datetimeFigureOut">
               <a:rPr lang="en-US" smtClean="0"/>
-              <a:t>11/21/16</a:t>
+              <a:t>12/5/16</a:t>
             </a:fld>
             <a:endParaRPr lang="en-US" dirty="0"/>
           </a:p>
@@ -413,7 +413,7 @@
           <a:p>
             <a:fld id="{A2505382-DCEE-8E4A-85B6-A05CFA2DF929}" type="datetimeFigureOut">
               <a:rPr lang="en-US" smtClean="0"/>
-              <a:t>11/21/16</a:t>
+              <a:t>12/5/16</a:t>
             </a:fld>
             <a:endParaRPr lang="en-US" dirty="0"/>
           </a:p>
@@ -593,7 +593,7 @@
           <a:p>
             <a:fld id="{A2505382-DCEE-8E4A-85B6-A05CFA2DF929}" type="datetimeFigureOut">
               <a:rPr lang="en-US" smtClean="0"/>
-              <a:t>11/21/16</a:t>
+              <a:t>12/5/16</a:t>
             </a:fld>
             <a:endParaRPr lang="en-US" dirty="0"/>
           </a:p>
@@ -763,7 +763,7 @@
           <a:p>
             <a:fld id="{A2505382-DCEE-8E4A-85B6-A05CFA2DF929}" type="datetimeFigureOut">
               <a:rPr lang="en-US" smtClean="0"/>
-              <a:t>11/21/16</a:t>
+              <a:t>12/5/16</a:t>
             </a:fld>
             <a:endParaRPr lang="en-US" dirty="0"/>
           </a:p>
@@ -1009,7 +1009,7 @@
           <a:p>
             <a:fld id="{A2505382-DCEE-8E4A-85B6-A05CFA2DF929}" type="datetimeFigureOut">
               <a:rPr lang="en-US" smtClean="0"/>
-              <a:t>11/21/16</a:t>
+              <a:t>12/5/16</a:t>
             </a:fld>
             <a:endParaRPr lang="en-US" dirty="0"/>
           </a:p>
@@ -1241,7 +1241,7 @@
           <a:p>
             <a:fld id="{A2505382-DCEE-8E4A-85B6-A05CFA2DF929}" type="datetimeFigureOut">
               <a:rPr lang="en-US" smtClean="0"/>
-              <a:t>11/21/16</a:t>
+              <a:t>12/5/16</a:t>
             </a:fld>
             <a:endParaRPr lang="en-US" dirty="0"/>
           </a:p>
@@ -1608,7 +1608,7 @@
           <a:p>
             <a:fld id="{A2505382-DCEE-8E4A-85B6-A05CFA2DF929}" type="datetimeFigureOut">
               <a:rPr lang="en-US" smtClean="0"/>
-              <a:t>11/21/16</a:t>
+              <a:t>12/5/16</a:t>
             </a:fld>
             <a:endParaRPr lang="en-US" dirty="0"/>
           </a:p>
@@ -1726,7 +1726,7 @@
           <a:p>
             <a:fld id="{A2505382-DCEE-8E4A-85B6-A05CFA2DF929}" type="datetimeFigureOut">
               <a:rPr lang="en-US" smtClean="0"/>
-              <a:t>11/21/16</a:t>
+              <a:t>12/5/16</a:t>
             </a:fld>
             <a:endParaRPr lang="en-US" dirty="0"/>
           </a:p>
@@ -1821,7 +1821,7 @@
           <a:p>
             <a:fld id="{A2505382-DCEE-8E4A-85B6-A05CFA2DF929}" type="datetimeFigureOut">
               <a:rPr lang="en-US" smtClean="0"/>
-              <a:t>11/21/16</a:t>
+              <a:t>12/5/16</a:t>
             </a:fld>
             <a:endParaRPr lang="en-US" dirty="0"/>
           </a:p>
@@ -2098,7 +2098,7 @@
           <a:p>
             <a:fld id="{A2505382-DCEE-8E4A-85B6-A05CFA2DF929}" type="datetimeFigureOut">
               <a:rPr lang="en-US" smtClean="0"/>
-              <a:t>11/21/16</a:t>
+              <a:t>12/5/16</a:t>
             </a:fld>
             <a:endParaRPr lang="en-US" dirty="0"/>
           </a:p>
@@ -2351,7 +2351,7 @@
           <a:p>
             <a:fld id="{A2505382-DCEE-8E4A-85B6-A05CFA2DF929}" type="datetimeFigureOut">
               <a:rPr lang="en-US" smtClean="0"/>
-              <a:t>11/21/16</a:t>
+              <a:t>12/5/16</a:t>
             </a:fld>
             <a:endParaRPr lang="en-US" dirty="0"/>
           </a:p>
@@ -2564,7 +2564,7 @@
           <a:p>
             <a:fld id="{A2505382-DCEE-8E4A-85B6-A05CFA2DF929}" type="datetimeFigureOut">
               <a:rPr lang="en-US" smtClean="0"/>
-              <a:t>11/21/16</a:t>
+              <a:t>12/5/16</a:t>
             </a:fld>
             <a:endParaRPr lang="en-US" dirty="0"/>
           </a:p>
@@ -3318,8 +3318,8 @@
         </p:nvSpPr>
         <p:spPr>
           <a:xfrm>
-            <a:off x="5624988" y="1038476"/>
-            <a:ext cx="1564852" cy="307777"/>
+            <a:off x="5654644" y="1038476"/>
+            <a:ext cx="1505541" cy="307777"/>
           </a:xfrm>
           <a:prstGeom prst="rect">
             <a:avLst/>
@@ -3339,7 +3339,23 @@
                 <a:ea typeface="Times New Roman" charset="0"/>
                 <a:cs typeface="Times New Roman" charset="0"/>
               </a:rPr>
-              <a:t>3. Lookup function</a:t>
+              <a:t>3. </a:t>
+            </a:r>
+            <a:r>
+              <a:rPr lang="en-US" sz="1400" dirty="0" smtClean="0">
+                <a:latin typeface="Times New Roman" charset="0"/>
+                <a:ea typeface="Times New Roman" charset="0"/>
+                <a:cs typeface="Times New Roman" charset="0"/>
+              </a:rPr>
+              <a:t>lookup </a:t>
+            </a:r>
+            <a:r>
+              <a:rPr lang="en-US" sz="1400" dirty="0" smtClean="0">
+                <a:latin typeface="Times New Roman" charset="0"/>
+                <a:ea typeface="Times New Roman" charset="0"/>
+                <a:cs typeface="Times New Roman" charset="0"/>
+              </a:rPr>
+              <a:t>function</a:t>
             </a:r>
             <a:endParaRPr lang="en-US" sz="1400" dirty="0">
               <a:latin typeface="Times New Roman" charset="0"/>
@@ -3468,8 +3484,8 @@
         </p:nvSpPr>
         <p:spPr>
           <a:xfrm>
-            <a:off x="2699442" y="2027810"/>
-            <a:ext cx="1744388" cy="307777"/>
+            <a:off x="2719479" y="2027810"/>
+            <a:ext cx="1704314" cy="307777"/>
           </a:xfrm>
           <a:prstGeom prst="rect">
             <a:avLst/>
@@ -3489,15 +3505,23 @@
                 <a:ea typeface="Times New Roman" charset="0"/>
                 <a:cs typeface="Times New Roman" charset="0"/>
               </a:rPr>
-              <a:t>5</a:t>
-            </a:r>
-            <a:r>
-              <a:rPr lang="en-US" sz="1400" smtClean="0">
+              <a:t>5. </a:t>
+            </a:r>
+            <a:r>
+              <a:rPr lang="en-US" sz="1400" dirty="0" smtClean="0">
                 <a:latin typeface="Times New Roman" charset="0"/>
                 <a:ea typeface="Times New Roman" charset="0"/>
                 <a:cs typeface="Times New Roman" charset="0"/>
               </a:rPr>
-              <a:t>. Function definition</a:t>
+              <a:t>function </a:t>
+            </a:r>
+            <a:r>
+              <a:rPr lang="en-US" sz="1400" dirty="0" smtClean="0">
+                <a:latin typeface="Times New Roman" charset="0"/>
+                <a:ea typeface="Times New Roman" charset="0"/>
+                <a:cs typeface="Times New Roman" charset="0"/>
+              </a:rPr>
+              <a:t>definition</a:t>
             </a:r>
             <a:endParaRPr lang="en-US" sz="1400" dirty="0">
               <a:latin typeface="Times New Roman" charset="0"/>
@@ -3577,7 +3601,23 @@
                 <a:ea typeface="Times New Roman" charset="0"/>
                 <a:cs typeface="Times New Roman" charset="0"/>
               </a:rPr>
-              <a:t>6. Register function</a:t>
+              <a:t>6. </a:t>
+            </a:r>
+            <a:r>
+              <a:rPr lang="en-US" sz="1400" dirty="0" smtClean="0">
+                <a:latin typeface="Times New Roman" charset="0"/>
+                <a:ea typeface="Times New Roman" charset="0"/>
+                <a:cs typeface="Times New Roman" charset="0"/>
+              </a:rPr>
+              <a:t>register </a:t>
+            </a:r>
+            <a:r>
+              <a:rPr lang="en-US" sz="1400" dirty="0" smtClean="0">
+                <a:latin typeface="Times New Roman" charset="0"/>
+                <a:ea typeface="Times New Roman" charset="0"/>
+                <a:cs typeface="Times New Roman" charset="0"/>
+              </a:rPr>
+              <a:t>function</a:t>
             </a:r>
             <a:endParaRPr lang="en-US" sz="1400" dirty="0">
               <a:latin typeface="Times New Roman" charset="0"/>
@@ -3737,8 +3777,8 @@
         </p:nvSpPr>
         <p:spPr>
           <a:xfrm>
-            <a:off x="6133808" y="3244911"/>
-            <a:ext cx="1585692" cy="307777"/>
+            <a:off x="6148236" y="3244911"/>
+            <a:ext cx="1556837" cy="307777"/>
           </a:xfrm>
           <a:prstGeom prst="rect">
             <a:avLst/>
@@ -3758,7 +3798,23 @@
                 <a:ea typeface="Times New Roman" charset="0"/>
                 <a:cs typeface="Times New Roman" charset="0"/>
               </a:rPr>
-              <a:t>7. Execute function</a:t>
+              <a:t>7. </a:t>
+            </a:r>
+            <a:r>
+              <a:rPr lang="en-US" sz="1400" dirty="0" smtClean="0">
+                <a:latin typeface="Times New Roman" charset="0"/>
+                <a:ea typeface="Times New Roman" charset="0"/>
+                <a:cs typeface="Times New Roman" charset="0"/>
+              </a:rPr>
+              <a:t>execute </a:t>
+            </a:r>
+            <a:r>
+              <a:rPr lang="en-US" sz="1400" dirty="0" smtClean="0">
+                <a:latin typeface="Times New Roman" charset="0"/>
+                <a:ea typeface="Times New Roman" charset="0"/>
+                <a:cs typeface="Times New Roman" charset="0"/>
+              </a:rPr>
+              <a:t>function</a:t>
             </a:r>
             <a:endParaRPr lang="en-US" sz="1400" dirty="0">
               <a:latin typeface="Times New Roman" charset="0"/>
@@ -3812,8 +3868,8 @@
         </p:nvSpPr>
         <p:spPr>
           <a:xfrm>
-            <a:off x="2850314" y="3593442"/>
-            <a:ext cx="1446230" cy="307777"/>
+            <a:off x="2870352" y="3593442"/>
+            <a:ext cx="1406154" cy="307777"/>
           </a:xfrm>
           <a:prstGeom prst="rect">
             <a:avLst/>
@@ -3833,7 +3889,23 @@
                 <a:ea typeface="Times New Roman" charset="0"/>
                 <a:cs typeface="Times New Roman" charset="0"/>
               </a:rPr>
-              <a:t>8. Function result</a:t>
+              <a:t>8. </a:t>
+            </a:r>
+            <a:r>
+              <a:rPr lang="en-US" sz="1400" dirty="0" smtClean="0">
+                <a:latin typeface="Times New Roman" charset="0"/>
+                <a:ea typeface="Times New Roman" charset="0"/>
+                <a:cs typeface="Times New Roman" charset="0"/>
+              </a:rPr>
+              <a:t>function </a:t>
+            </a:r>
+            <a:r>
+              <a:rPr lang="en-US" sz="1400" dirty="0" smtClean="0">
+                <a:latin typeface="Times New Roman" charset="0"/>
+                <a:ea typeface="Times New Roman" charset="0"/>
+                <a:cs typeface="Times New Roman" charset="0"/>
+              </a:rPr>
+              <a:t>result</a:t>
             </a:r>
             <a:endParaRPr lang="en-US" sz="1400" dirty="0">
               <a:latin typeface="Times New Roman" charset="0"/>
@@ -3908,7 +3980,23 @@
                 <a:ea typeface="Times New Roman" charset="0"/>
                 <a:cs typeface="Times New Roman" charset="0"/>
               </a:rPr>
-              <a:t>9. Invoke success handler</a:t>
+              <a:t>9. </a:t>
+            </a:r>
+            <a:r>
+              <a:rPr lang="en-US" sz="1400" dirty="0" smtClean="0">
+                <a:latin typeface="Times New Roman" charset="0"/>
+                <a:ea typeface="Times New Roman" charset="0"/>
+                <a:cs typeface="Times New Roman" charset="0"/>
+              </a:rPr>
+              <a:t>invoke </a:t>
+            </a:r>
+            <a:r>
+              <a:rPr lang="en-US" sz="1400" dirty="0" smtClean="0">
+                <a:latin typeface="Times New Roman" charset="0"/>
+                <a:ea typeface="Times New Roman" charset="0"/>
+                <a:cs typeface="Times New Roman" charset="0"/>
+              </a:rPr>
+              <a:t>success handler</a:t>
             </a:r>
             <a:endParaRPr lang="en-US" sz="1400" dirty="0">
               <a:latin typeface="Times New Roman" charset="0"/>

</xml_diff>